<commit_message>
cleaned up repo and edited PPT
</commit_message>
<xml_diff>
--- a/docs/Team Project 3.pptx
+++ b/docs/Team Project 3.pptx
@@ -197,7 +197,7 @@
           <a:p>
             <a:fld id="{C892A736-616F-324E-8E35-C41840D574A6}" type="datetimeFigureOut">
               <a:rPr lang="en-US" smtClean="0"/>
-              <a:t>6/16/19</a:t>
+              <a:t>6/17/19</a:t>
             </a:fld>
             <a:endParaRPr lang="en-US"/>
           </a:p>
@@ -660,11 +660,11 @@
   <p:clrMapOvr>
     <a:masterClrMapping/>
   </p:clrMapOvr>
-  <mc:AlternateContent xmlns:mc="http://schemas.openxmlformats.org/markup-compatibility/2006">
-    <mc:Choice xmlns:p14="http://schemas.microsoft.com/office/powerpoint/2010/main" Requires="p14">
+  <mc:AlternateContent xmlns:mc="http://schemas.openxmlformats.org/markup-compatibility/2006" xmlns:p14="http://schemas.microsoft.com/office/powerpoint/2010/main">
+    <mc:Choice Requires="p14">
       <p:transition spd="slow" p14:dur="2000"/>
     </mc:Choice>
-    <mc:Fallback>
+    <mc:Fallback xmlns="">
       <p:transition xmlns:p14="http://schemas.microsoft.com/office/powerpoint/2010/main" spd="slow"/>
     </mc:Fallback>
   </mc:AlternateContent>
@@ -858,11 +858,11 @@
   <p:sldLayoutIdLst>
     <p:sldLayoutId id="2147483756" r:id="rId1"/>
   </p:sldLayoutIdLst>
-  <mc:AlternateContent xmlns:mc="http://schemas.openxmlformats.org/markup-compatibility/2006">
-    <mc:Choice xmlns:p14="http://schemas.microsoft.com/office/powerpoint/2010/main" Requires="p14">
+  <mc:AlternateContent xmlns:mc="http://schemas.openxmlformats.org/markup-compatibility/2006" xmlns:p14="http://schemas.microsoft.com/office/powerpoint/2010/main">
+    <mc:Choice Requires="p14">
       <p:transition spd="slow" p14:dur="2000"/>
     </mc:Choice>
-    <mc:Fallback>
+    <mc:Fallback xmlns="">
       <p:transition xmlns:p14="http://schemas.microsoft.com/office/powerpoint/2010/main" spd="slow"/>
     </mc:Fallback>
   </mc:AlternateContent>
@@ -1709,11 +1709,11 @@
   <p:clrMapOvr>
     <a:masterClrMapping/>
   </p:clrMapOvr>
-  <mc:AlternateContent xmlns:mc="http://schemas.openxmlformats.org/markup-compatibility/2006">
-    <mc:Choice xmlns:p14="http://schemas.microsoft.com/office/powerpoint/2010/main" Requires="p14">
+  <mc:AlternateContent xmlns:mc="http://schemas.openxmlformats.org/markup-compatibility/2006" xmlns:p14="http://schemas.microsoft.com/office/powerpoint/2010/main">
+    <mc:Choice Requires="p14">
       <p:transition spd="slow" p14:dur="2000"/>
     </mc:Choice>
-    <mc:Fallback>
+    <mc:Fallback xmlns="">
       <p:transition xmlns:p14="http://schemas.microsoft.com/office/powerpoint/2010/main" spd="slow"/>
     </mc:Fallback>
   </mc:AlternateContent>
@@ -1864,15 +1864,15 @@
         </p:nvSpPr>
         <p:spPr>
           <a:xfrm>
-            <a:off x="1151291" y="3657600"/>
-            <a:ext cx="9889241" cy="1591734"/>
+            <a:off x="1235957" y="3657600"/>
+            <a:ext cx="9804575" cy="1778000"/>
           </a:xfrm>
           <a:prstGeom prst="rect">
             <a:avLst/>
           </a:prstGeom>
         </p:spPr>
         <p:txBody>
-          <a:bodyPr numCol="6" spcCol="210312">
+          <a:bodyPr wrap="none" lIns="0" rIns="0" numCol="6" spcCol="210312">
             <a:noAutofit/>
           </a:bodyPr>
           <a:lstStyle>
@@ -2147,7 +2147,25 @@
                 </a:solidFill>
                 <a:latin typeface="Avenir Medium"/>
               </a:rPr>
-              <a:t>Project Manager, API Research, JS Developer;</a:t>
+              <a:t>Project Manager, API Research, JS </a:t>
+            </a:r>
+            <a:r>
+              <a:rPr lang="en-US" sz="1400" dirty="0" smtClean="0">
+                <a:solidFill>
+                  <a:schemeClr val="bg1"/>
+                </a:solidFill>
+                <a:latin typeface="Avenir Medium"/>
+              </a:rPr>
+              <a:t>Developer,</a:t>
+            </a:r>
+            <a:r>
+              <a:rPr lang="en-US" sz="1400" dirty="0" smtClean="0">
+                <a:solidFill>
+                  <a:schemeClr val="bg1"/>
+                </a:solidFill>
+                <a:latin typeface="Avenir Medium"/>
+              </a:rPr>
+              <a:t/>
             </a:r>
             <a:br>
               <a:rPr lang="en-US" sz="1400" dirty="0" smtClean="0">
@@ -2164,63 +2182,8 @@
                 </a:solidFill>
                 <a:latin typeface="Avenir Medium"/>
               </a:rPr>
-              <a:t>Code Reviewer</a:t>
-            </a:r>
-          </a:p>
-          <a:p>
-            <a:pPr marL="0" indent="0">
-              <a:lnSpc>
-                <a:spcPts val="2120"/>
-              </a:lnSpc>
-              <a:spcBef>
-                <a:spcPts val="0"/>
-              </a:spcBef>
-              <a:spcAft>
-                <a:spcPts val="300"/>
-              </a:spcAft>
-              <a:buNone/>
-            </a:pPr>
-            <a:r>
-              <a:rPr lang="en-US" sz="1600" u="sng" dirty="0" smtClean="0">
-                <a:solidFill>
-                  <a:schemeClr val="bg1"/>
-                </a:solidFill>
-                <a:latin typeface="Avenir Heavy"/>
-                <a:cs typeface="Avenir Heavy"/>
-              </a:rPr>
-              <a:t>John </a:t>
-            </a:r>
-            <a:r>
-              <a:rPr lang="en-US" sz="1600" u="sng" dirty="0" err="1" smtClean="0">
-                <a:solidFill>
-                  <a:schemeClr val="bg1"/>
-                </a:solidFill>
-                <a:latin typeface="Avenir Heavy"/>
-                <a:cs typeface="Avenir Heavy"/>
-              </a:rPr>
-              <a:t>Dahle</a:t>
-            </a:r>
-            <a:endParaRPr lang="en-US" sz="1600" dirty="0">
-              <a:solidFill>
-                <a:schemeClr val="bg1"/>
-              </a:solidFill>
-              <a:latin typeface="Avenir Heavy"/>
-              <a:cs typeface="Avenir Heavy"/>
-            </a:endParaRPr>
-          </a:p>
-          <a:p>
-            <a:pPr marL="0" indent="0">
-              <a:lnSpc>
-                <a:spcPts val="2120"/>
-              </a:lnSpc>
-              <a:spcBef>
-                <a:spcPts val="0"/>
-              </a:spcBef>
-              <a:spcAft>
-                <a:spcPts val="300"/>
-              </a:spcAft>
-              <a:buNone/>
-            </a:pPr>
+              <a:t>Code </a:t>
+            </a:r>
             <a:r>
               <a:rPr lang="en-US" sz="1400" dirty="0" smtClean="0">
                 <a:solidFill>
@@ -2228,61 +2191,7 @@
                 </a:solidFill>
                 <a:latin typeface="Avenir Medium"/>
               </a:rPr>
-              <a:t>R </a:t>
-            </a:r>
-            <a:r>
-              <a:rPr lang="en-US" sz="1400" dirty="0">
-                <a:solidFill>
-                  <a:schemeClr val="bg1"/>
-                </a:solidFill>
-                <a:latin typeface="Avenir Medium"/>
-              </a:rPr>
-              <a:t>&amp; </a:t>
-            </a:r>
-            <a:r>
-              <a:rPr lang="en-US" sz="1400" dirty="0" smtClean="0">
-                <a:solidFill>
-                  <a:schemeClr val="bg1"/>
-                </a:solidFill>
-                <a:latin typeface="Avenir Medium"/>
-              </a:rPr>
-              <a:t>D: API </a:t>
-            </a:r>
-            <a:r>
-              <a:rPr lang="en-US" sz="1400" dirty="0">
-                <a:solidFill>
-                  <a:schemeClr val="bg1"/>
-                </a:solidFill>
-                <a:latin typeface="Avenir Medium"/>
-              </a:rPr>
-              <a:t>usage; </a:t>
-            </a:r>
-            <a:r>
-              <a:rPr lang="en-US" sz="1400" dirty="0" smtClean="0">
-                <a:solidFill>
-                  <a:schemeClr val="bg1"/>
-                </a:solidFill>
-                <a:latin typeface="Avenir Medium"/>
-              </a:rPr>
-              <a:t>JS</a:t>
-            </a:r>
-            <a:r>
-              <a:rPr lang="en-US" sz="1400" dirty="0">
-                <a:solidFill>
-                  <a:schemeClr val="bg1"/>
-                </a:solidFill>
-                <a:latin typeface="Avenir Medium"/>
-              </a:rPr>
-              <a:t> </a:t>
-            </a:r>
-            <a:r>
-              <a:rPr lang="en-US" sz="1400" dirty="0" smtClean="0">
-                <a:solidFill>
-                  <a:schemeClr val="bg1"/>
-                </a:solidFill>
-                <a:latin typeface="Avenir Medium"/>
-              </a:rPr>
-              <a:t>Developer; Code Reviewer</a:t>
+              <a:t>Reviewer</a:t>
             </a:r>
           </a:p>
           <a:p>
@@ -2326,8 +2235,25 @@
                 <a:latin typeface="Avenir Heavy"/>
                 <a:cs typeface="Avenir Heavy"/>
               </a:rPr>
-              <a:t>Madeleine Kemeny </a:t>
-            </a:r>
+              <a:t>John </a:t>
+            </a:r>
+            <a:r>
+              <a:rPr lang="en-US" sz="1600" u="sng" dirty="0" err="1" smtClean="0">
+                <a:solidFill>
+                  <a:schemeClr val="bg1"/>
+                </a:solidFill>
+                <a:latin typeface="Avenir Heavy"/>
+                <a:cs typeface="Avenir Heavy"/>
+              </a:rPr>
+              <a:t>Dahle</a:t>
+            </a:r>
+            <a:endParaRPr lang="en-US" sz="1600" dirty="0">
+              <a:solidFill>
+                <a:schemeClr val="bg1"/>
+              </a:solidFill>
+              <a:latin typeface="Avenir Heavy"/>
+              <a:cs typeface="Avenir Heavy"/>
+            </a:endParaRPr>
           </a:p>
           <a:p>
             <a:pPr marL="0" indent="0">
@@ -2349,16 +2275,35 @@
                 </a:solidFill>
                 <a:latin typeface="Avenir Medium"/>
               </a:rPr>
-              <a:t>R &amp; D: UI/UX;</a:t>
-            </a:r>
-            <a:br>
+              <a:t>R </a:t>
+            </a:r>
+            <a:r>
+              <a:rPr lang="en-US" sz="1400" dirty="0">
+                <a:solidFill>
+                  <a:schemeClr val="bg1"/>
+                </a:solidFill>
+                <a:latin typeface="Avenir Medium"/>
+              </a:rPr>
+              <a:t>&amp; </a:t>
+            </a:r>
+            <a:r>
               <a:rPr lang="en-US" sz="1400" dirty="0" smtClean="0">
                 <a:solidFill>
                   <a:schemeClr val="bg1"/>
                 </a:solidFill>
                 <a:latin typeface="Avenir Medium"/>
               </a:rPr>
-            </a:br>
+              <a:t>D: API </a:t>
+            </a:r>
+            <a:r>
+              <a:rPr lang="en-US" sz="1400" dirty="0">
+                <a:solidFill>
+                  <a:schemeClr val="bg1"/>
+                </a:solidFill>
+                <a:latin typeface="Avenir Medium"/>
+              </a:rPr>
+              <a:t>usage; </a:t>
+            </a:r>
             <a:r>
               <a:rPr lang="en-US" sz="1400" dirty="0" smtClean="0">
                 <a:solidFill>
@@ -2366,26 +2311,41 @@
                 </a:solidFill>
                 <a:latin typeface="Avenir Medium"/>
               </a:rPr>
-              <a:t>Code Reviewer</a:t>
-            </a:r>
-            <a:r>
-              <a:rPr lang="en-US" sz="1600" dirty="0" smtClean="0">
-                <a:solidFill>
-                  <a:schemeClr val="bg1"/>
-                </a:solidFill>
-                <a:latin typeface="Avenir Medium"/>
-              </a:rPr>
-              <a:t/>
-            </a:r>
-            <a:br>
-              <a:rPr lang="en-US" sz="1600" dirty="0" smtClean="0">
-                <a:solidFill>
-                  <a:schemeClr val="bg1"/>
-                </a:solidFill>
-                <a:latin typeface="Avenir Medium"/>
-              </a:rPr>
-            </a:br>
-            <a:endParaRPr lang="en-US" sz="1600" dirty="0" smtClean="0">
+              <a:t>JS</a:t>
+            </a:r>
+            <a:r>
+              <a:rPr lang="en-US" sz="1400" dirty="0">
+                <a:solidFill>
+                  <a:schemeClr val="bg1"/>
+                </a:solidFill>
+                <a:latin typeface="Avenir Medium"/>
+              </a:rPr>
+              <a:t> </a:t>
+            </a:r>
+            <a:r>
+              <a:rPr lang="en-US" sz="1400" dirty="0" smtClean="0">
+                <a:solidFill>
+                  <a:schemeClr val="bg1"/>
+                </a:solidFill>
+                <a:latin typeface="Avenir Medium"/>
+              </a:rPr>
+              <a:t>Developer; Code Reviewer</a:t>
+            </a:r>
+          </a:p>
+          <a:p>
+            <a:pPr marL="0" indent="0">
+              <a:lnSpc>
+                <a:spcPts val="2120"/>
+              </a:lnSpc>
+              <a:spcBef>
+                <a:spcPts val="0"/>
+              </a:spcBef>
+              <a:spcAft>
+                <a:spcPts val="300"/>
+              </a:spcAft>
+              <a:buNone/>
+            </a:pPr>
+            <a:endParaRPr lang="en-US" sz="1400" dirty="0" smtClean="0">
               <a:solidFill>
                 <a:schemeClr val="bg1"/>
               </a:solidFill>
@@ -2405,26 +2365,6 @@
               </a:spcAft>
               <a:buNone/>
             </a:pPr>
-            <a:r>
-              <a:rPr lang="en-US" sz="1600" u="sng" dirty="0" smtClean="0">
-                <a:solidFill>
-                  <a:schemeClr val="bg1"/>
-                </a:solidFill>
-                <a:latin typeface="Avenir Heavy"/>
-                <a:cs typeface="Avenir Heavy"/>
-              </a:rPr>
-              <a:t>Daniel </a:t>
-            </a:r>
-            <a:r>
-              <a:rPr lang="en-US" sz="1600" u="sng" dirty="0" err="1" smtClean="0">
-                <a:solidFill>
-                  <a:schemeClr val="bg1"/>
-                </a:solidFill>
-                <a:latin typeface="Avenir Heavy"/>
-                <a:cs typeface="Avenir Heavy"/>
-              </a:rPr>
-              <a:t>Fripp</a:t>
-            </a:r>
             <a:endParaRPr lang="en-US" sz="1600" u="sng" dirty="0" smtClean="0">
               <a:solidFill>
                 <a:schemeClr val="bg1"/>
@@ -2447,6 +2387,177 @@
               <a:buNone/>
             </a:pPr>
             <a:r>
+              <a:rPr lang="en-US" sz="1600" u="sng" dirty="0" smtClean="0">
+                <a:solidFill>
+                  <a:schemeClr val="bg1"/>
+                </a:solidFill>
+                <a:latin typeface="Avenir Heavy"/>
+                <a:cs typeface="Avenir Heavy"/>
+              </a:rPr>
+              <a:t>Madeleine </a:t>
+            </a:r>
+            <a:r>
+              <a:rPr lang="en-US" sz="1600" u="sng" dirty="0" smtClean="0">
+                <a:solidFill>
+                  <a:schemeClr val="bg1"/>
+                </a:solidFill>
+                <a:latin typeface="Avenir Heavy"/>
+                <a:cs typeface="Avenir Heavy"/>
+              </a:rPr>
+              <a:t>Kemeny </a:t>
+            </a:r>
+          </a:p>
+          <a:p>
+            <a:pPr marL="0" indent="0">
+              <a:lnSpc>
+                <a:spcPts val="2120"/>
+              </a:lnSpc>
+              <a:spcBef>
+                <a:spcPts val="0"/>
+              </a:spcBef>
+              <a:spcAft>
+                <a:spcPts val="300"/>
+              </a:spcAft>
+              <a:buNone/>
+            </a:pPr>
+            <a:r>
+              <a:rPr lang="en-US" sz="1400" dirty="0" smtClean="0">
+                <a:solidFill>
+                  <a:schemeClr val="bg1"/>
+                </a:solidFill>
+                <a:latin typeface="Avenir Medium"/>
+              </a:rPr>
+              <a:t>R &amp; D: UI/UX;</a:t>
+            </a:r>
+            <a:br>
+              <a:rPr lang="en-US" sz="1400" dirty="0" smtClean="0">
+                <a:solidFill>
+                  <a:schemeClr val="bg1"/>
+                </a:solidFill>
+                <a:latin typeface="Avenir Medium"/>
+              </a:rPr>
+            </a:br>
+            <a:r>
+              <a:rPr lang="en-US" sz="1400" dirty="0" smtClean="0">
+                <a:solidFill>
+                  <a:schemeClr val="bg1"/>
+                </a:solidFill>
+                <a:latin typeface="Avenir Medium"/>
+              </a:rPr>
+              <a:t>Code</a:t>
+            </a:r>
+            <a:r>
+              <a:rPr lang="en-US" sz="1400" dirty="0" smtClean="0">
+                <a:solidFill>
+                  <a:schemeClr val="bg1"/>
+                </a:solidFill>
+                <a:latin typeface="Avenir Medium"/>
+                <a:cs typeface="Avenir Medium"/>
+              </a:rPr>
+              <a:t> </a:t>
+            </a:r>
+            <a:r>
+              <a:rPr lang="en-US" sz="1400" dirty="0" smtClean="0">
+                <a:solidFill>
+                  <a:schemeClr val="bg1"/>
+                </a:solidFill>
+                <a:latin typeface="Avenir Medium"/>
+                <a:cs typeface="Avenir Medium"/>
+              </a:rPr>
+              <a:t>Reviewer</a:t>
+            </a:r>
+            <a:r>
+              <a:rPr lang="en-US" sz="1600" dirty="0" smtClean="0">
+                <a:solidFill>
+                  <a:schemeClr val="bg1"/>
+                </a:solidFill>
+                <a:latin typeface="Avenir Medium"/>
+                <a:cs typeface="Avenir Medium"/>
+              </a:rPr>
+              <a:t>;</a:t>
+            </a:r>
+            <a:br>
+              <a:rPr lang="en-US" sz="1600" dirty="0" smtClean="0">
+                <a:solidFill>
+                  <a:schemeClr val="bg1"/>
+                </a:solidFill>
+                <a:latin typeface="Avenir Medium"/>
+                <a:cs typeface="Avenir Medium"/>
+              </a:rPr>
+            </a:br>
+            <a:r>
+              <a:rPr lang="en-US" sz="1400" b="1" dirty="0" smtClean="0">
+                <a:solidFill>
+                  <a:schemeClr val="bg1"/>
+                </a:solidFill>
+                <a:latin typeface="Avenir Medium"/>
+                <a:cs typeface="Avenir Medium"/>
+              </a:rPr>
+              <a:t>Presentation Developer</a:t>
+            </a:r>
+            <a:endParaRPr lang="en-US" sz="1400" b="1" dirty="0" smtClean="0">
+              <a:solidFill>
+                <a:schemeClr val="bg1"/>
+              </a:solidFill>
+              <a:latin typeface="Avenir Medium"/>
+              <a:cs typeface="Avenir Medium"/>
+            </a:endParaRPr>
+          </a:p>
+          <a:p>
+            <a:pPr marL="0" indent="0">
+              <a:lnSpc>
+                <a:spcPts val="2120"/>
+              </a:lnSpc>
+              <a:spcBef>
+                <a:spcPts val="0"/>
+              </a:spcBef>
+              <a:spcAft>
+                <a:spcPts val="300"/>
+              </a:spcAft>
+              <a:buNone/>
+            </a:pPr>
+            <a:r>
+              <a:rPr lang="en-US" sz="1600" u="sng" dirty="0" smtClean="0">
+                <a:solidFill>
+                  <a:schemeClr val="bg1"/>
+                </a:solidFill>
+                <a:latin typeface="Avenir Heavy"/>
+                <a:cs typeface="Avenir Heavy"/>
+              </a:rPr>
+              <a:t>Daniel </a:t>
+            </a:r>
+            <a:r>
+              <a:rPr lang="en-US" sz="1600" u="sng" dirty="0" err="1" smtClean="0">
+                <a:solidFill>
+                  <a:schemeClr val="bg1"/>
+                </a:solidFill>
+                <a:latin typeface="Avenir Heavy"/>
+                <a:cs typeface="Avenir Heavy"/>
+              </a:rPr>
+              <a:t>Fripp</a:t>
+            </a:r>
+            <a:endParaRPr lang="en-US" sz="1600" u="sng" dirty="0" smtClean="0">
+              <a:solidFill>
+                <a:schemeClr val="bg1"/>
+              </a:solidFill>
+              <a:latin typeface="Avenir Heavy"/>
+              <a:cs typeface="Avenir Heavy"/>
+            </a:endParaRPr>
+          </a:p>
+          <a:p>
+            <a:pPr marL="0" indent="0">
+              <a:lnSpc>
+                <a:spcPts val="2120"/>
+              </a:lnSpc>
+              <a:spcBef>
+                <a:spcPts val="0"/>
+              </a:spcBef>
+              <a:spcAft>
+                <a:spcPts val="300"/>
+              </a:spcAft>
+              <a:buNone/>
+            </a:pPr>
+            <a:r>
               <a:rPr lang="en-US" sz="1400" dirty="0" smtClean="0">
                 <a:solidFill>
                   <a:schemeClr val="bg1"/>
@@ -2510,8 +2621,29 @@
               </a:spcAft>
               <a:buNone/>
             </a:pPr>
-            <a:r>
-              <a:rPr lang="en-US" sz="1600" u="sng" dirty="0">
+            <a:endParaRPr lang="en-US" sz="1600" u="sng" dirty="0" smtClean="0">
+              <a:solidFill>
+                <a:schemeClr val="bg1"/>
+              </a:solidFill>
+              <a:latin typeface="Avenir Heavy"/>
+              <a:cs typeface="Avenir Heavy"/>
+            </a:endParaRPr>
+          </a:p>
+          <a:p>
+            <a:pPr marL="0" indent="0">
+              <a:lnSpc>
+                <a:spcPts val="2120"/>
+              </a:lnSpc>
+              <a:spcBef>
+                <a:spcPts val="0"/>
+              </a:spcBef>
+              <a:spcAft>
+                <a:spcPts val="300"/>
+              </a:spcAft>
+              <a:buNone/>
+            </a:pPr>
+            <a:r>
+              <a:rPr lang="en-US" sz="1600" u="sng" dirty="0" smtClean="0">
                 <a:solidFill>
                   <a:schemeClr val="bg1"/>
                 </a:solidFill>
@@ -2904,11 +3036,11 @@
   <p:clrMapOvr>
     <a:masterClrMapping/>
   </p:clrMapOvr>
-  <mc:AlternateContent xmlns:mc="http://schemas.openxmlformats.org/markup-compatibility/2006">
-    <mc:Choice xmlns:p14="http://schemas.microsoft.com/office/powerpoint/2010/main" Requires="p14">
+  <mc:AlternateContent xmlns:mc="http://schemas.openxmlformats.org/markup-compatibility/2006" xmlns:p14="http://schemas.microsoft.com/office/powerpoint/2010/main">
+    <mc:Choice Requires="p14">
       <p:transition spd="slow" p14:dur="2000"/>
     </mc:Choice>
-    <mc:Fallback>
+    <mc:Fallback xmlns="">
       <p:transition xmlns:p14="http://schemas.microsoft.com/office/powerpoint/2010/main" spd="slow"/>
     </mc:Fallback>
   </mc:AlternateContent>
@@ -3353,11 +3485,11 @@
   <p:clrMapOvr>
     <a:masterClrMapping/>
   </p:clrMapOvr>
-  <mc:AlternateContent xmlns:mc="http://schemas.openxmlformats.org/markup-compatibility/2006">
-    <mc:Choice xmlns:p14="http://schemas.microsoft.com/office/powerpoint/2010/main" Requires="p14">
+  <mc:AlternateContent xmlns:mc="http://schemas.openxmlformats.org/markup-compatibility/2006" xmlns:p14="http://schemas.microsoft.com/office/powerpoint/2010/main">
+    <mc:Choice Requires="p14">
       <p:transition spd="slow" p14:dur="2000"/>
     </mc:Choice>
-    <mc:Fallback>
+    <mc:Fallback xmlns="">
       <p:transition xmlns:p14="http://schemas.microsoft.com/office/powerpoint/2010/main" spd="slow"/>
     </mc:Fallback>
   </mc:AlternateContent>
@@ -3826,11 +3958,11 @@
   <p:clrMapOvr>
     <a:masterClrMapping/>
   </p:clrMapOvr>
-  <mc:AlternateContent xmlns:mc="http://schemas.openxmlformats.org/markup-compatibility/2006">
-    <mc:Choice xmlns:p14="http://schemas.microsoft.com/office/powerpoint/2010/main" Requires="p14">
+  <mc:AlternateContent xmlns:mc="http://schemas.openxmlformats.org/markup-compatibility/2006" xmlns:p14="http://schemas.microsoft.com/office/powerpoint/2010/main">
+    <mc:Choice Requires="p14">
       <p:transition spd="slow" p14:dur="2000"/>
     </mc:Choice>
-    <mc:Fallback>
+    <mc:Fallback xmlns="">
       <p:transition xmlns:p14="http://schemas.microsoft.com/office/powerpoint/2010/main" spd="slow"/>
     </mc:Fallback>
   </mc:AlternateContent>
@@ -3878,7 +4010,7 @@
         <p:spPr>
           <a:xfrm>
             <a:off x="1151292" y="3437471"/>
-            <a:ext cx="9821508" cy="2235200"/>
+            <a:ext cx="9821508" cy="1608662"/>
           </a:xfrm>
           <a:prstGeom prst="rect">
             <a:avLst/>
@@ -4357,11 +4489,11 @@
   <p:clrMapOvr>
     <a:masterClrMapping/>
   </p:clrMapOvr>
-  <mc:AlternateContent xmlns:mc="http://schemas.openxmlformats.org/markup-compatibility/2006">
-    <mc:Choice xmlns:p14="http://schemas.microsoft.com/office/powerpoint/2010/main" Requires="p14">
+  <mc:AlternateContent xmlns:mc="http://schemas.openxmlformats.org/markup-compatibility/2006" xmlns:p14="http://schemas.microsoft.com/office/powerpoint/2010/main">
+    <mc:Choice Requires="p14">
       <p:transition spd="slow" p14:dur="2000"/>
     </mc:Choice>
-    <mc:Fallback>
+    <mc:Fallback xmlns="">
       <p:transition xmlns:p14="http://schemas.microsoft.com/office/powerpoint/2010/main" spd="slow"/>
     </mc:Fallback>
   </mc:AlternateContent>
@@ -4809,11 +4941,11 @@
   <p:clrMapOvr>
     <a:masterClrMapping/>
   </p:clrMapOvr>
-  <mc:AlternateContent xmlns:mc="http://schemas.openxmlformats.org/markup-compatibility/2006">
-    <mc:Choice xmlns:p14="http://schemas.microsoft.com/office/powerpoint/2010/main" Requires="p14">
+  <mc:AlternateContent xmlns:mc="http://schemas.openxmlformats.org/markup-compatibility/2006" xmlns:p14="http://schemas.microsoft.com/office/powerpoint/2010/main">
+    <mc:Choice Requires="p14">
       <p:transition spd="slow" p14:dur="2000"/>
     </mc:Choice>
-    <mc:Fallback>
+    <mc:Fallback xmlns="">
       <p:transition xmlns:p14="http://schemas.microsoft.com/office/powerpoint/2010/main" spd="slow"/>
     </mc:Fallback>
   </mc:AlternateContent>

</xml_diff>